<commit_message>
Add xdebug for logs in the powerpoint
</commit_message>
<xml_diff>
--- a/Tests unitaires et fonctionnels.pptx
+++ b/Tests unitaires et fonctionnels.pptx
@@ -5,7 +5,7 @@
     <p:sldMasterId id="2147483648" r:id="rId1"/>
   </p:sldMasterIdLst>
   <p:notesMasterIdLst>
-    <p:notesMasterId r:id="rId58"/>
+    <p:notesMasterId r:id="rId59"/>
   </p:notesMasterIdLst>
   <p:sldIdLst>
     <p:sldId id="256" r:id="rId2"/>
@@ -45,25 +45,26 @@
     <p:sldId id="295" r:id="rId36"/>
     <p:sldId id="291" r:id="rId37"/>
     <p:sldId id="274" r:id="rId38"/>
-    <p:sldId id="276" r:id="rId39"/>
-    <p:sldId id="286" r:id="rId40"/>
-    <p:sldId id="283" r:id="rId41"/>
-    <p:sldId id="294" r:id="rId42"/>
-    <p:sldId id="275" r:id="rId43"/>
-    <p:sldId id="297" r:id="rId44"/>
-    <p:sldId id="298" r:id="rId45"/>
-    <p:sldId id="296" r:id="rId46"/>
-    <p:sldId id="268" r:id="rId47"/>
-    <p:sldId id="290" r:id="rId48"/>
-    <p:sldId id="306" r:id="rId49"/>
-    <p:sldId id="310" r:id="rId50"/>
-    <p:sldId id="312" r:id="rId51"/>
-    <p:sldId id="284" r:id="rId52"/>
-    <p:sldId id="301" r:id="rId53"/>
-    <p:sldId id="302" r:id="rId54"/>
-    <p:sldId id="303" r:id="rId55"/>
-    <p:sldId id="304" r:id="rId56"/>
-    <p:sldId id="269" r:id="rId57"/>
+    <p:sldId id="313" r:id="rId39"/>
+    <p:sldId id="276" r:id="rId40"/>
+    <p:sldId id="286" r:id="rId41"/>
+    <p:sldId id="283" r:id="rId42"/>
+    <p:sldId id="294" r:id="rId43"/>
+    <p:sldId id="275" r:id="rId44"/>
+    <p:sldId id="297" r:id="rId45"/>
+    <p:sldId id="298" r:id="rId46"/>
+    <p:sldId id="296" r:id="rId47"/>
+    <p:sldId id="268" r:id="rId48"/>
+    <p:sldId id="290" r:id="rId49"/>
+    <p:sldId id="306" r:id="rId50"/>
+    <p:sldId id="310" r:id="rId51"/>
+    <p:sldId id="312" r:id="rId52"/>
+    <p:sldId id="284" r:id="rId53"/>
+    <p:sldId id="301" r:id="rId54"/>
+    <p:sldId id="302" r:id="rId55"/>
+    <p:sldId id="303" r:id="rId56"/>
+    <p:sldId id="304" r:id="rId57"/>
+    <p:sldId id="269" r:id="rId58"/>
   </p:sldIdLst>
   <p:sldSz cx="12192000" cy="6858000"/>
   <p:notesSz cx="6858000" cy="9144000"/>
@@ -214,8 +215,8 @@
 <p:cmLst xmlns:a="http://schemas.openxmlformats.org/drawingml/2006/main" xmlns:r="http://schemas.openxmlformats.org/officeDocument/2006/relationships" xmlns:p="http://schemas.openxmlformats.org/presentationml/2006/main">
   <p:cm authorId="1" dt="2019-02-25T15:05:09.993" idx="2">
     <p:pos x="4631" y="2399"/>
-    <p:text>(*) Nous verrons plus tard que PantherTestCase et WebTestCase héritent de TestCase et qu'elles peuvent donc faire appel à ses fonctions.</p:text>
-    <p:extLst>
+    <p:text>(*) Nous verrons plus tard que PantherTestCase et WebTestCase étendent TestCase et qu'elles peuvent donc faire appel à ses fonctions.</p:text>
+    <p:extLst mod="1">
       <p:ext uri="{C676402C-5697-4E1C-873F-D02D1690AC5C}">
         <p15:threadingInfo xmlns:p15="http://schemas.microsoft.com/office/powerpoint/2012/main" timeZoneBias="-60"/>
       </p:ext>
@@ -926,7 +927,7 @@
           <a:p>
             <a:fld id="{5C20D268-D42A-4458-B323-BBF9AF1E1380}" type="slidenum">
               <a:rPr lang="fr-FR" smtClean="0"/>
-              <a:t>49</a:t>
+              <a:t>50</a:t>
             </a:fld>
             <a:endParaRPr lang="fr-FR"/>
           </a:p>
@@ -1014,7 +1015,7 @@
           <a:p>
             <a:fld id="{5C20D268-D42A-4458-B323-BBF9AF1E1380}" type="slidenum">
               <a:rPr lang="fr-FR" smtClean="0"/>
-              <a:t>50</a:t>
+              <a:t>51</a:t>
             </a:fld>
             <a:endParaRPr lang="fr-FR"/>
           </a:p>
@@ -15660,7 +15661,7 @@
           <a:graphicData uri="http://schemas.openxmlformats.org/presentationml/2006/ole">
             <mc:AlternateContent xmlns:mc="http://schemas.openxmlformats.org/markup-compatibility/2006">
               <mc:Choice xmlns:v="urn:schemas-microsoft-com:vml" Requires="v">
-                <p:oleObj spid="_x0000_s8270" name="Objet d’environnement du Gestionnaire de liaisons" showAsIcon="1" r:id="rId4" imgW="979200" imgH="491040" progId="Package">
+                <p:oleObj spid="_x0000_s8273" name="Objet d’environnement du Gestionnaire de liaisons" showAsIcon="1" r:id="rId4" imgW="979200" imgH="491040" progId="Package">
                   <p:embed/>
                 </p:oleObj>
               </mc:Choice>
@@ -16724,7 +16725,7 @@
           <p:nvPr>
             <p:extLst>
               <p:ext uri="{D42A27DB-BD31-4B8C-83A1-F6EECF244321}">
-                <p14:modId xmlns:p14="http://schemas.microsoft.com/office/powerpoint/2010/main" val="2950510560"/>
+                <p14:modId xmlns:p14="http://schemas.microsoft.com/office/powerpoint/2010/main" val="2178080402"/>
               </p:ext>
             </p:extLst>
           </p:nvPr>
@@ -16804,7 +16805,7 @@
                       </a:r>
                       <a:r>
                         <a:rPr lang="fr-FR" b="0" dirty="0" err="1" smtClean="0"/>
-                        <a:t>someUnitTest</a:t>
+                        <a:t>testSomeUnitTest</a:t>
                       </a:r>
                       <a:r>
                         <a:rPr lang="fr-FR" b="0" dirty="0" smtClean="0"/>
@@ -17337,7 +17338,7 @@
           <p:nvPr>
             <p:extLst>
               <p:ext uri="{D42A27DB-BD31-4B8C-83A1-F6EECF244321}">
-                <p14:modId xmlns:p14="http://schemas.microsoft.com/office/powerpoint/2010/main" val="2659819439"/>
+                <p14:modId xmlns:p14="http://schemas.microsoft.com/office/powerpoint/2010/main" val="3946171100"/>
               </p:ext>
             </p:extLst>
           </p:nvPr>
@@ -17456,6 +17457,7 @@
                         <a:rPr lang="fr-FR" b="0" dirty="0" smtClean="0"/>
                         <a:t>');</a:t>
                       </a:r>
+                      <a:endParaRPr lang="fr-FR" b="0" dirty="0" smtClean="0"/>
                     </a:p>
                     <a:p>
                       <a:pPr marL="400050" lvl="1" indent="0">
@@ -17639,7 +17641,7 @@
           <p:nvPr>
             <p:extLst>
               <p:ext uri="{D42A27DB-BD31-4B8C-83A1-F6EECF244321}">
-                <p14:modId xmlns:p14="http://schemas.microsoft.com/office/powerpoint/2010/main" val="2097305763"/>
+                <p14:modId xmlns:p14="http://schemas.microsoft.com/office/powerpoint/2010/main" val="2720217926"/>
               </p:ext>
             </p:extLst>
           </p:nvPr>
@@ -17711,7 +17713,7 @@
                       </a:r>
                       <a:r>
                         <a:rPr lang="fr-FR" b="0" dirty="0" err="1" smtClean="0"/>
-                        <a:t>someUnitTest</a:t>
+                        <a:t>testSomeUnitTest</a:t>
                       </a:r>
                       <a:r>
                         <a:rPr lang="fr-FR" b="0" dirty="0" smtClean="0"/>
@@ -20324,10 +20326,6 @@
               <a:rPr lang="fr-FR" dirty="0" err="1" smtClean="0"/>
               <a:t>liib</a:t>
             </a:r>
-            <a:r>
-              <a:rPr lang="fr-FR" dirty="0" smtClean="0"/>
-              <a:t>?</a:t>
-            </a:r>
             <a:endParaRPr lang="fr-FR" dirty="0"/>
           </a:p>
         </p:txBody>
@@ -23007,6 +23005,429 @@
 </file>
 
 <file path=ppt/slides/slide38.xml><?xml version="1.0" encoding="utf-8"?>
+<p:sld xmlns:a="http://schemas.openxmlformats.org/drawingml/2006/main" xmlns:r="http://schemas.openxmlformats.org/officeDocument/2006/relationships" xmlns:p="http://schemas.openxmlformats.org/presentationml/2006/main">
+  <p:cSld>
+    <p:spTree>
+      <p:nvGrpSpPr>
+        <p:cNvPr id="1" name=""/>
+        <p:cNvGrpSpPr/>
+        <p:nvPr/>
+      </p:nvGrpSpPr>
+      <p:grpSpPr>
+        <a:xfrm>
+          <a:off x="0" y="0"/>
+          <a:ext cx="0" cy="0"/>
+          <a:chOff x="0" y="0"/>
+          <a:chExt cx="0" cy="0"/>
+        </a:xfrm>
+      </p:grpSpPr>
+      <p:sp>
+        <p:nvSpPr>
+          <p:cNvPr id="2" name="Titre 1"/>
+          <p:cNvSpPr>
+            <a:spLocks noGrp="1"/>
+          </p:cNvSpPr>
+          <p:nvPr>
+            <p:ph type="title"/>
+          </p:nvPr>
+        </p:nvSpPr>
+        <p:spPr/>
+        <p:txBody>
+          <a:bodyPr/>
+          <a:lstStyle/>
+          <a:p>
+            <a:r>
+              <a:rPr lang="fr-FR" dirty="0" smtClean="0"/>
+              <a:t>Exports – Activer </a:t>
+            </a:r>
+            <a:r>
+              <a:rPr lang="fr-FR" dirty="0" err="1" smtClean="0"/>
+              <a:t>XDebug</a:t>
+            </a:r>
+            <a:endParaRPr lang="fr-FR" dirty="0"/>
+          </a:p>
+        </p:txBody>
+      </p:sp>
+      <p:sp>
+        <p:nvSpPr>
+          <p:cNvPr id="3" name="Espace réservé du contenu 2"/>
+          <p:cNvSpPr>
+            <a:spLocks noGrp="1"/>
+          </p:cNvSpPr>
+          <p:nvPr>
+            <p:ph idx="1"/>
+          </p:nvPr>
+        </p:nvSpPr>
+        <p:spPr/>
+        <p:txBody>
+          <a:bodyPr/>
+          <a:lstStyle/>
+          <a:p>
+            <a:r>
+              <a:rPr lang="fr-FR" dirty="0" smtClean="0"/>
+              <a:t>Dans votre fichier php.ini il faut activer </a:t>
+            </a:r>
+            <a:r>
+              <a:rPr lang="fr-FR" b="1" dirty="0" err="1" smtClean="0"/>
+              <a:t>Xdebug</a:t>
+            </a:r>
+            <a:r>
+              <a:rPr lang="fr-FR" dirty="0" smtClean="0"/>
+              <a:t> pour pouvoir générer des exports.</a:t>
+            </a:r>
+          </a:p>
+          <a:p>
+            <a:pPr marL="0" indent="0">
+              <a:buNone/>
+            </a:pPr>
+            <a:r>
+              <a:rPr lang="fr-FR" dirty="0" smtClean="0"/>
+              <a:t>Installation :</a:t>
+            </a:r>
+          </a:p>
+          <a:p>
+            <a:pPr marL="0" indent="0">
+              <a:buNone/>
+            </a:pPr>
+            <a:endParaRPr lang="fr-FR" dirty="0"/>
+          </a:p>
+          <a:p>
+            <a:pPr marL="0" indent="0">
+              <a:buNone/>
+            </a:pPr>
+            <a:endParaRPr lang="fr-FR" dirty="0" smtClean="0"/>
+          </a:p>
+          <a:p>
+            <a:pPr marL="0" indent="0">
+              <a:buNone/>
+            </a:pPr>
+            <a:r>
+              <a:rPr lang="fr-FR" dirty="0" smtClean="0"/>
+              <a:t>Activation :</a:t>
+            </a:r>
+          </a:p>
+          <a:p>
+            <a:pPr marL="0" indent="0">
+              <a:buNone/>
+            </a:pPr>
+            <a:endParaRPr lang="fr-FR" dirty="0" smtClean="0"/>
+          </a:p>
+          <a:p>
+            <a:endParaRPr lang="fr-FR" dirty="0"/>
+          </a:p>
+        </p:txBody>
+      </p:sp>
+      <p:graphicFrame>
+        <p:nvGraphicFramePr>
+          <p:cNvPr id="4" name="Tableau 3"/>
+          <p:cNvGraphicFramePr>
+            <a:graphicFrameLocks noGrp="1"/>
+          </p:cNvGraphicFramePr>
+          <p:nvPr>
+            <p:extLst>
+              <p:ext uri="{D42A27DB-BD31-4B8C-83A1-F6EECF244321}">
+                <p14:modId xmlns:p14="http://schemas.microsoft.com/office/powerpoint/2010/main" val="477345392"/>
+              </p:ext>
+            </p:extLst>
+          </p:nvPr>
+        </p:nvGraphicFramePr>
+        <p:xfrm>
+          <a:off x="1154954" y="4811727"/>
+          <a:ext cx="8825660" cy="1601952"/>
+        </p:xfrm>
+        <a:graphic>
+          <a:graphicData uri="http://schemas.openxmlformats.org/drawingml/2006/table">
+            <a:tbl>
+              <a:tblPr firstRow="1" bandRow="1">
+                <a:tableStyleId>{5C22544A-7EE6-4342-B048-85BDC9FD1C3A}</a:tableStyleId>
+              </a:tblPr>
+              <a:tblGrid>
+                <a:gridCol w="8825660"/>
+              </a:tblGrid>
+              <a:tr h="1601952">
+                <a:tc>
+                  <a:txBody>
+                    <a:bodyPr/>
+                    <a:lstStyle/>
+                    <a:p>
+                      <a:pPr marL="0" marR="0" lvl="0" indent="0" algn="l" defTabSz="457200" rtl="0" eaLnBrk="1" fontAlgn="auto" latinLnBrk="0" hangingPunct="1">
+                        <a:lnSpc>
+                          <a:spcPct val="100000"/>
+                        </a:lnSpc>
+                        <a:spcBef>
+                          <a:spcPts val="0"/>
+                        </a:spcBef>
+                        <a:spcAft>
+                          <a:spcPts val="0"/>
+                        </a:spcAft>
+                        <a:buClrTx/>
+                        <a:buSzTx/>
+                        <a:buFontTx/>
+                        <a:buNone/>
+                        <a:tabLst/>
+                        <a:defRPr/>
+                      </a:pPr>
+                      <a:r>
+                        <a:rPr lang="fr-FR" dirty="0" err="1" smtClean="0"/>
+                        <a:t>Zend_extention</a:t>
+                      </a:r>
+                      <a:r>
+                        <a:rPr lang="fr-FR" dirty="0" smtClean="0"/>
+                        <a:t> = C:/…php_xdebug-...-x86_64.dll</a:t>
+                      </a:r>
+                    </a:p>
+                    <a:p>
+                      <a:pPr marL="0" marR="0" lvl="0" indent="0" algn="l" defTabSz="457200" rtl="0" eaLnBrk="1" fontAlgn="auto" latinLnBrk="0" hangingPunct="1">
+                        <a:lnSpc>
+                          <a:spcPct val="100000"/>
+                        </a:lnSpc>
+                        <a:spcBef>
+                          <a:spcPts val="0"/>
+                        </a:spcBef>
+                        <a:spcAft>
+                          <a:spcPts val="0"/>
+                        </a:spcAft>
+                        <a:buClrTx/>
+                        <a:buSzTx/>
+                        <a:buFontTx/>
+                        <a:buNone/>
+                        <a:tabLst/>
+                        <a:defRPr/>
+                      </a:pPr>
+                      <a:r>
+                        <a:rPr lang="fr-FR" dirty="0" smtClean="0"/>
+                        <a:t>[</a:t>
+                      </a:r>
+                      <a:r>
+                        <a:rPr lang="fr-FR" dirty="0" err="1" smtClean="0"/>
+                        <a:t>XDebug</a:t>
+                      </a:r>
+                      <a:r>
+                        <a:rPr lang="fr-FR" dirty="0" smtClean="0"/>
+                        <a:t>]</a:t>
+                      </a:r>
+                    </a:p>
+                    <a:p>
+                      <a:pPr marL="0" marR="0" lvl="0" indent="0" algn="l" defTabSz="457200" rtl="0" eaLnBrk="1" fontAlgn="auto" latinLnBrk="0" hangingPunct="1">
+                        <a:lnSpc>
+                          <a:spcPct val="100000"/>
+                        </a:lnSpc>
+                        <a:spcBef>
+                          <a:spcPts val="0"/>
+                        </a:spcBef>
+                        <a:spcAft>
+                          <a:spcPts val="0"/>
+                        </a:spcAft>
+                        <a:buClrTx/>
+                        <a:buSzTx/>
+                        <a:buFontTx/>
+                        <a:buNone/>
+                        <a:tabLst/>
+                        <a:defRPr/>
+                      </a:pPr>
+                      <a:r>
+                        <a:rPr lang="fr-FR" dirty="0" err="1" smtClean="0"/>
+                        <a:t>xdebug.remote_enable</a:t>
+                      </a:r>
+                      <a:r>
+                        <a:rPr lang="fr-FR" baseline="0" dirty="0" smtClean="0"/>
+                        <a:t> = 0</a:t>
+                      </a:r>
+                    </a:p>
+                    <a:p>
+                      <a:pPr marL="0" marR="0" lvl="0" indent="0" algn="l" defTabSz="457200" rtl="0" eaLnBrk="1" fontAlgn="auto" latinLnBrk="0" hangingPunct="1">
+                        <a:lnSpc>
+                          <a:spcPct val="100000"/>
+                        </a:lnSpc>
+                        <a:spcBef>
+                          <a:spcPts val="0"/>
+                        </a:spcBef>
+                        <a:spcAft>
+                          <a:spcPts val="0"/>
+                        </a:spcAft>
+                        <a:buClrTx/>
+                        <a:buSzTx/>
+                        <a:buFontTx/>
+                        <a:buNone/>
+                        <a:tabLst/>
+                        <a:defRPr/>
+                      </a:pPr>
+                      <a:r>
+                        <a:rPr lang="fr-FR" baseline="0" dirty="0" err="1" smtClean="0"/>
+                        <a:t>xdebug.remote_autostart</a:t>
+                      </a:r>
+                      <a:r>
+                        <a:rPr lang="fr-FR" baseline="0" dirty="0" smtClean="0"/>
+                        <a:t> = 0</a:t>
+                      </a:r>
+                    </a:p>
+                    <a:p>
+                      <a:pPr marL="0" marR="0" lvl="0" indent="0" algn="l" defTabSz="457200" rtl="0" eaLnBrk="1" fontAlgn="auto" latinLnBrk="0" hangingPunct="1">
+                        <a:lnSpc>
+                          <a:spcPct val="100000"/>
+                        </a:lnSpc>
+                        <a:spcBef>
+                          <a:spcPts val="0"/>
+                        </a:spcBef>
+                        <a:spcAft>
+                          <a:spcPts val="0"/>
+                        </a:spcAft>
+                        <a:buClrTx/>
+                        <a:buSzTx/>
+                        <a:buFontTx/>
+                        <a:buNone/>
+                        <a:tabLst/>
+                        <a:defRPr/>
+                      </a:pPr>
+                      <a:r>
+                        <a:rPr lang="fr-FR" baseline="0" dirty="0" err="1" smtClean="0"/>
+                        <a:t>xdebug.support</a:t>
+                      </a:r>
+                      <a:r>
+                        <a:rPr lang="fr-FR" baseline="0" dirty="0" smtClean="0"/>
+                        <a:t> = 1</a:t>
+                      </a:r>
+                      <a:endParaRPr lang="fr-FR" dirty="0" smtClean="0"/>
+                    </a:p>
+                  </a:txBody>
+                  <a:tcPr/>
+                </a:tc>
+              </a:tr>
+            </a:tbl>
+          </a:graphicData>
+        </a:graphic>
+      </p:graphicFrame>
+      <p:graphicFrame>
+        <p:nvGraphicFramePr>
+          <p:cNvPr id="5" name="Tableau 4"/>
+          <p:cNvGraphicFramePr>
+            <a:graphicFrameLocks noGrp="1"/>
+          </p:cNvGraphicFramePr>
+          <p:nvPr>
+            <p:extLst>
+              <p:ext uri="{D42A27DB-BD31-4B8C-83A1-F6EECF244321}">
+                <p14:modId xmlns:p14="http://schemas.microsoft.com/office/powerpoint/2010/main" val="2000951843"/>
+              </p:ext>
+            </p:extLst>
+          </p:nvPr>
+        </p:nvGraphicFramePr>
+        <p:xfrm>
+          <a:off x="1090707" y="3714982"/>
+          <a:ext cx="8825660" cy="702865"/>
+        </p:xfrm>
+        <a:graphic>
+          <a:graphicData uri="http://schemas.openxmlformats.org/drawingml/2006/table">
+            <a:tbl>
+              <a:tblPr firstRow="1" bandRow="1">
+                <a:tableStyleId>{5C22544A-7EE6-4342-B048-85BDC9FD1C3A}</a:tableStyleId>
+              </a:tblPr>
+              <a:tblGrid>
+                <a:gridCol w="8825660"/>
+              </a:tblGrid>
+              <a:tr h="702865">
+                <a:tc>
+                  <a:txBody>
+                    <a:bodyPr/>
+                    <a:lstStyle/>
+                    <a:p>
+                      <a:pPr marL="0" marR="0" lvl="0" indent="0" algn="l" defTabSz="457200" rtl="0" eaLnBrk="1" fontAlgn="auto" latinLnBrk="0" hangingPunct="1">
+                        <a:lnSpc>
+                          <a:spcPct val="100000"/>
+                        </a:lnSpc>
+                        <a:spcBef>
+                          <a:spcPts val="0"/>
+                        </a:spcBef>
+                        <a:spcAft>
+                          <a:spcPts val="0"/>
+                        </a:spcAft>
+                        <a:buClrTx/>
+                        <a:buSzTx/>
+                        <a:buFontTx/>
+                        <a:buNone/>
+                        <a:tabLst/>
+                        <a:defRPr/>
+                      </a:pPr>
+                      <a:r>
+                        <a:rPr lang="fr-FR" dirty="0" smtClean="0">
+                          <a:hlinkClick r:id="rId2"/>
+                        </a:rPr>
+                        <a:t>https://xdebug.org/download.php</a:t>
+                      </a:r>
+                      <a:r>
+                        <a:rPr lang="fr-FR" dirty="0" smtClean="0"/>
+                        <a:t> ou</a:t>
+                      </a:r>
+                    </a:p>
+                    <a:p>
+                      <a:pPr marL="0" marR="0" lvl="0" indent="0" algn="l" defTabSz="457200" rtl="0" eaLnBrk="1" fontAlgn="auto" latinLnBrk="0" hangingPunct="1">
+                        <a:lnSpc>
+                          <a:spcPct val="100000"/>
+                        </a:lnSpc>
+                        <a:spcBef>
+                          <a:spcPts val="0"/>
+                        </a:spcBef>
+                        <a:spcAft>
+                          <a:spcPts val="0"/>
+                        </a:spcAft>
+                        <a:buClrTx/>
+                        <a:buSzTx/>
+                        <a:buFontTx/>
+                        <a:buNone/>
+                        <a:tabLst/>
+                        <a:defRPr/>
+                      </a:pPr>
+                      <a:r>
+                        <a:rPr lang="fr-FR" dirty="0" err="1" smtClean="0"/>
+                        <a:t>sudo</a:t>
+                      </a:r>
+                      <a:r>
+                        <a:rPr lang="fr-FR" dirty="0" smtClean="0"/>
+                        <a:t> </a:t>
+                      </a:r>
+                      <a:r>
+                        <a:rPr lang="fr-FR" dirty="0" err="1" smtClean="0"/>
+                        <a:t>apt-get</a:t>
+                      </a:r>
+                      <a:r>
+                        <a:rPr lang="fr-FR" dirty="0" smtClean="0"/>
+                        <a:t> </a:t>
+                      </a:r>
+                      <a:r>
+                        <a:rPr lang="fr-FR" dirty="0" err="1" smtClean="0"/>
+                        <a:t>install</a:t>
+                      </a:r>
+                      <a:r>
+                        <a:rPr lang="fr-FR" dirty="0" smtClean="0"/>
+                        <a:t> </a:t>
+                      </a:r>
+                      <a:r>
+                        <a:rPr lang="fr-FR" dirty="0" err="1" smtClean="0"/>
+                        <a:t>php-xdebug</a:t>
+                      </a:r>
+                      <a:endParaRPr lang="fr-FR" dirty="0" smtClean="0"/>
+                    </a:p>
+                  </a:txBody>
+                  <a:tcPr/>
+                </a:tc>
+              </a:tr>
+            </a:tbl>
+          </a:graphicData>
+        </a:graphic>
+      </p:graphicFrame>
+    </p:spTree>
+    <p:extLst>
+      <p:ext uri="{BB962C8B-B14F-4D97-AF65-F5344CB8AC3E}">
+        <p14:creationId xmlns:p14="http://schemas.microsoft.com/office/powerpoint/2010/main" val="507592576"/>
+      </p:ext>
+    </p:extLst>
+  </p:cSld>
+  <p:clrMapOvr>
+    <a:masterClrMapping/>
+  </p:clrMapOvr>
+</p:sld>
+</file>
+
+<file path=ppt/slides/slide39.xml><?xml version="1.0" encoding="utf-8"?>
 <p:sld xmlns:a="http://schemas.openxmlformats.org/drawingml/2006/main" xmlns:r="http://schemas.openxmlformats.org/officeDocument/2006/relationships" xmlns:p="http://schemas.openxmlformats.org/presentationml/2006/main">
   <p:cSld>
     <p:spTree>
@@ -23157,7 +23578,90 @@
 </p:sld>
 </file>
 
-<file path=ppt/slides/slide39.xml><?xml version="1.0" encoding="utf-8"?>
+<file path=ppt/slides/slide4.xml><?xml version="1.0" encoding="utf-8"?>
+<p:sld xmlns:a="http://schemas.openxmlformats.org/drawingml/2006/main" xmlns:r="http://schemas.openxmlformats.org/officeDocument/2006/relationships" xmlns:p="http://schemas.openxmlformats.org/presentationml/2006/main">
+  <p:cSld>
+    <p:spTree>
+      <p:nvGrpSpPr>
+        <p:cNvPr id="1" name=""/>
+        <p:cNvGrpSpPr/>
+        <p:nvPr/>
+      </p:nvGrpSpPr>
+      <p:grpSpPr>
+        <a:xfrm>
+          <a:off x="0" y="0"/>
+          <a:ext cx="0" cy="0"/>
+          <a:chOff x="0" y="0"/>
+          <a:chExt cx="0" cy="0"/>
+        </a:xfrm>
+      </p:grpSpPr>
+      <p:sp>
+        <p:nvSpPr>
+          <p:cNvPr id="9" name="Titre 8"/>
+          <p:cNvSpPr>
+            <a:spLocks noGrp="1"/>
+          </p:cNvSpPr>
+          <p:nvPr>
+            <p:ph type="title"/>
+          </p:nvPr>
+        </p:nvSpPr>
+        <p:spPr/>
+        <p:txBody>
+          <a:bodyPr/>
+          <a:lstStyle/>
+          <a:p>
+            <a:r>
+              <a:rPr lang="fr-FR" dirty="0" smtClean="0"/>
+              <a:t>Complexité cognitive</a:t>
+            </a:r>
+            <a:endParaRPr lang="fr-FR" dirty="0"/>
+          </a:p>
+        </p:txBody>
+      </p:sp>
+      <p:sp>
+        <p:nvSpPr>
+          <p:cNvPr id="10" name="Espace réservé du texte 9"/>
+          <p:cNvSpPr>
+            <a:spLocks noGrp="1"/>
+          </p:cNvSpPr>
+          <p:nvPr>
+            <p:ph type="body" idx="1"/>
+          </p:nvPr>
+        </p:nvSpPr>
+        <p:spPr/>
+        <p:txBody>
+          <a:bodyPr/>
+          <a:lstStyle/>
+          <a:p>
+            <a:r>
+              <a:rPr lang="fr-FR" dirty="0" smtClean="0"/>
+              <a:t>Mesure crée en décembre 2016 par sonar source</a:t>
+            </a:r>
+            <a:endParaRPr lang="fr-FR" dirty="0"/>
+          </a:p>
+        </p:txBody>
+      </p:sp>
+    </p:spTree>
+    <p:extLst>
+      <p:ext uri="{BB962C8B-B14F-4D97-AF65-F5344CB8AC3E}">
+        <p14:creationId xmlns:p14="http://schemas.microsoft.com/office/powerpoint/2010/main" val="826248683"/>
+      </p:ext>
+    </p:extLst>
+  </p:cSld>
+  <p:clrMapOvr>
+    <a:masterClrMapping/>
+  </p:clrMapOvr>
+  <p:timing>
+    <p:tnLst>
+      <p:par>
+        <p:cTn id="1" dur="indefinite" restart="never" nodeType="tmRoot"/>
+      </p:par>
+    </p:tnLst>
+  </p:timing>
+</p:sld>
+</file>
+
+<file path=ppt/slides/slide40.xml><?xml version="1.0" encoding="utf-8"?>
 <p:sld xmlns:a="http://schemas.openxmlformats.org/drawingml/2006/main" xmlns:r="http://schemas.openxmlformats.org/officeDocument/2006/relationships" xmlns:p="http://schemas.openxmlformats.org/presentationml/2006/main">
   <p:cSld>
     <p:spTree>
@@ -23352,90 +23856,7 @@
 </p:sld>
 </file>
 
-<file path=ppt/slides/slide4.xml><?xml version="1.0" encoding="utf-8"?>
-<p:sld xmlns:a="http://schemas.openxmlformats.org/drawingml/2006/main" xmlns:r="http://schemas.openxmlformats.org/officeDocument/2006/relationships" xmlns:p="http://schemas.openxmlformats.org/presentationml/2006/main">
-  <p:cSld>
-    <p:spTree>
-      <p:nvGrpSpPr>
-        <p:cNvPr id="1" name=""/>
-        <p:cNvGrpSpPr/>
-        <p:nvPr/>
-      </p:nvGrpSpPr>
-      <p:grpSpPr>
-        <a:xfrm>
-          <a:off x="0" y="0"/>
-          <a:ext cx="0" cy="0"/>
-          <a:chOff x="0" y="0"/>
-          <a:chExt cx="0" cy="0"/>
-        </a:xfrm>
-      </p:grpSpPr>
-      <p:sp>
-        <p:nvSpPr>
-          <p:cNvPr id="9" name="Titre 8"/>
-          <p:cNvSpPr>
-            <a:spLocks noGrp="1"/>
-          </p:cNvSpPr>
-          <p:nvPr>
-            <p:ph type="title"/>
-          </p:nvPr>
-        </p:nvSpPr>
-        <p:spPr/>
-        <p:txBody>
-          <a:bodyPr/>
-          <a:lstStyle/>
-          <a:p>
-            <a:r>
-              <a:rPr lang="fr-FR" dirty="0" smtClean="0"/>
-              <a:t>Complexité cognitive</a:t>
-            </a:r>
-            <a:endParaRPr lang="fr-FR" dirty="0"/>
-          </a:p>
-        </p:txBody>
-      </p:sp>
-      <p:sp>
-        <p:nvSpPr>
-          <p:cNvPr id="10" name="Espace réservé du texte 9"/>
-          <p:cNvSpPr>
-            <a:spLocks noGrp="1"/>
-          </p:cNvSpPr>
-          <p:nvPr>
-            <p:ph type="body" idx="1"/>
-          </p:nvPr>
-        </p:nvSpPr>
-        <p:spPr/>
-        <p:txBody>
-          <a:bodyPr/>
-          <a:lstStyle/>
-          <a:p>
-            <a:r>
-              <a:rPr lang="fr-FR" dirty="0" smtClean="0"/>
-              <a:t>Mesure crée en décembre 2016 par sonar source</a:t>
-            </a:r>
-            <a:endParaRPr lang="fr-FR" dirty="0"/>
-          </a:p>
-        </p:txBody>
-      </p:sp>
-    </p:spTree>
-    <p:extLst>
-      <p:ext uri="{BB962C8B-B14F-4D97-AF65-F5344CB8AC3E}">
-        <p14:creationId xmlns:p14="http://schemas.microsoft.com/office/powerpoint/2010/main" val="826248683"/>
-      </p:ext>
-    </p:extLst>
-  </p:cSld>
-  <p:clrMapOvr>
-    <a:masterClrMapping/>
-  </p:clrMapOvr>
-  <p:timing>
-    <p:tnLst>
-      <p:par>
-        <p:cTn id="1" dur="indefinite" restart="never" nodeType="tmRoot"/>
-      </p:par>
-    </p:tnLst>
-  </p:timing>
-</p:sld>
-</file>
-
-<file path=ppt/slides/slide40.xml><?xml version="1.0" encoding="utf-8"?>
+<file path=ppt/slides/slide41.xml><?xml version="1.0" encoding="utf-8"?>
 <p:sld xmlns:a="http://schemas.openxmlformats.org/drawingml/2006/main" xmlns:r="http://schemas.openxmlformats.org/officeDocument/2006/relationships" xmlns:p="http://schemas.openxmlformats.org/presentationml/2006/main">
   <p:cSld>
     <p:spTree>
@@ -23855,7 +24276,7 @@
 </p:sld>
 </file>
 
-<file path=ppt/slides/slide41.xml><?xml version="1.0" encoding="utf-8"?>
+<file path=ppt/slides/slide42.xml><?xml version="1.0" encoding="utf-8"?>
 <p:sld xmlns:a="http://schemas.openxmlformats.org/drawingml/2006/main" xmlns:r="http://schemas.openxmlformats.org/officeDocument/2006/relationships" xmlns:p="http://schemas.openxmlformats.org/presentationml/2006/main">
   <p:cSld>
     <p:spTree>
@@ -24577,178 +24998,6 @@
 </p:sld>
 </file>
 
-<file path=ppt/slides/slide42.xml><?xml version="1.0" encoding="utf-8"?>
-<p:sld xmlns:a="http://schemas.openxmlformats.org/drawingml/2006/main" xmlns:r="http://schemas.openxmlformats.org/officeDocument/2006/relationships" xmlns:p="http://schemas.openxmlformats.org/presentationml/2006/main">
-  <p:cSld>
-    <p:spTree>
-      <p:nvGrpSpPr>
-        <p:cNvPr id="1" name=""/>
-        <p:cNvGrpSpPr/>
-        <p:nvPr/>
-      </p:nvGrpSpPr>
-      <p:grpSpPr>
-        <a:xfrm>
-          <a:off x="0" y="0"/>
-          <a:ext cx="0" cy="0"/>
-          <a:chOff x="0" y="0"/>
-          <a:chExt cx="0" cy="0"/>
-        </a:xfrm>
-      </p:grpSpPr>
-      <p:sp>
-        <p:nvSpPr>
-          <p:cNvPr id="2" name="Titre 1"/>
-          <p:cNvSpPr>
-            <a:spLocks noGrp="1"/>
-          </p:cNvSpPr>
-          <p:nvPr>
-            <p:ph type="title"/>
-          </p:nvPr>
-        </p:nvSpPr>
-        <p:spPr/>
-        <p:txBody>
-          <a:bodyPr/>
-          <a:lstStyle/>
-          <a:p>
-            <a:r>
-              <a:rPr lang="fr-FR" dirty="0" smtClean="0"/>
-              <a:t>Configuration en mode </a:t>
-            </a:r>
-            <a:r>
-              <a:rPr lang="fr-FR" dirty="0" smtClean="0">
-                <a:solidFill>
-                  <a:srgbClr val="00B050"/>
-                </a:solidFill>
-              </a:rPr>
-              <a:t>CI/CD</a:t>
-            </a:r>
-            <a:endParaRPr lang="fr-FR" dirty="0">
-              <a:solidFill>
-                <a:srgbClr val="00B050"/>
-              </a:solidFill>
-            </a:endParaRPr>
-          </a:p>
-        </p:txBody>
-      </p:sp>
-      <p:sp>
-        <p:nvSpPr>
-          <p:cNvPr id="3" name="Espace réservé du contenu 2"/>
-          <p:cNvSpPr>
-            <a:spLocks noGrp="1"/>
-          </p:cNvSpPr>
-          <p:nvPr>
-            <p:ph idx="1"/>
-          </p:nvPr>
-        </p:nvSpPr>
-        <p:spPr/>
-        <p:txBody>
-          <a:bodyPr/>
-          <a:lstStyle/>
-          <a:p>
-            <a:r>
-              <a:rPr lang="fr-FR" dirty="0" smtClean="0"/>
-              <a:t>Travis : </a:t>
-            </a:r>
-          </a:p>
-          <a:p>
-            <a:pPr marL="0" indent="0">
-              <a:buNone/>
-            </a:pPr>
-            <a:r>
-              <a:rPr lang="fr-FR" dirty="0" smtClean="0">
-                <a:hlinkClick r:id="rId2"/>
-              </a:rPr>
-              <a:t>https</a:t>
-            </a:r>
-            <a:r>
-              <a:rPr lang="fr-FR" dirty="0">
-                <a:hlinkClick r:id="rId2"/>
-              </a:rPr>
-              <a:t>://</a:t>
-            </a:r>
-            <a:r>
-              <a:rPr lang="fr-FR" dirty="0" smtClean="0">
-                <a:hlinkClick r:id="rId2"/>
-              </a:rPr>
-              <a:t>openclassrooms.com/fr/courses/4087056-testez-et-suivez-letat-de-votre-application-php/4419481-tp-mettre-en-place-un-outil-dintegration-continue-travis</a:t>
-            </a:r>
-            <a:endParaRPr lang="fr-FR" dirty="0" smtClean="0"/>
-          </a:p>
-          <a:p>
-            <a:pPr marL="0" indent="0">
-              <a:buNone/>
-            </a:pPr>
-            <a:r>
-              <a:rPr lang="fr-FR" dirty="0">
-                <a:hlinkClick r:id="rId3"/>
-              </a:rPr>
-              <a:t>https://</a:t>
-            </a:r>
-            <a:r>
-              <a:rPr lang="fr-FR" dirty="0" smtClean="0">
-                <a:hlinkClick r:id="rId3"/>
-              </a:rPr>
-              <a:t>github.com/MarcusBarnes/mik/issues/272</a:t>
-            </a:r>
-            <a:endParaRPr lang="fr-FR" dirty="0" smtClean="0"/>
-          </a:p>
-          <a:p>
-            <a:pPr marL="0" indent="0">
-              <a:buNone/>
-            </a:pPr>
-            <a:endParaRPr lang="fr-FR" dirty="0" smtClean="0"/>
-          </a:p>
-          <a:p>
-            <a:r>
-              <a:rPr lang="fr-FR" dirty="0" smtClean="0"/>
-              <a:t>Jenkins : </a:t>
-            </a:r>
-          </a:p>
-          <a:p>
-            <a:pPr marL="0" indent="0">
-              <a:buNone/>
-            </a:pPr>
-            <a:r>
-              <a:rPr lang="fr-FR" dirty="0">
-                <a:hlinkClick r:id="rId4"/>
-              </a:rPr>
-              <a:t>https://blog.pascal-martin.fr/post/integration-continue-jenkins-projet-php</a:t>
-            </a:r>
-            <a:r>
-              <a:rPr lang="fr-FR" dirty="0" smtClean="0">
-                <a:hlinkClick r:id="rId4"/>
-              </a:rPr>
-              <a:t>/</a:t>
-            </a:r>
-            <a:endParaRPr lang="fr-FR" dirty="0" smtClean="0"/>
-          </a:p>
-          <a:p>
-            <a:pPr marL="0" indent="0">
-              <a:buNone/>
-            </a:pPr>
-            <a:endParaRPr lang="fr-FR" dirty="0"/>
-          </a:p>
-        </p:txBody>
-      </p:sp>
-    </p:spTree>
-    <p:extLst>
-      <p:ext uri="{BB962C8B-B14F-4D97-AF65-F5344CB8AC3E}">
-        <p14:creationId xmlns:p14="http://schemas.microsoft.com/office/powerpoint/2010/main" val="412892584"/>
-      </p:ext>
-    </p:extLst>
-  </p:cSld>
-  <p:clrMapOvr>
-    <a:masterClrMapping/>
-  </p:clrMapOvr>
-  <p:timing>
-    <p:tnLst>
-      <p:par>
-        <p:cTn id="1" dur="indefinite" restart="never" nodeType="tmRoot"/>
-      </p:par>
-    </p:tnLst>
-  </p:timing>
-</p:sld>
-</file>
-
 <file path=ppt/slides/slide43.xml><?xml version="1.0" encoding="utf-8"?>
 <p:sld xmlns:a="http://schemas.openxmlformats.org/drawingml/2006/main" xmlns:r="http://schemas.openxmlformats.org/officeDocument/2006/relationships" xmlns:p="http://schemas.openxmlformats.org/presentationml/2006/main">
   <p:cSld>
@@ -24817,6 +25066,178 @@
           <a:lstStyle/>
           <a:p>
             <a:r>
+              <a:rPr lang="fr-FR" dirty="0" smtClean="0"/>
+              <a:t>Travis : </a:t>
+            </a:r>
+          </a:p>
+          <a:p>
+            <a:pPr marL="0" indent="0">
+              <a:buNone/>
+            </a:pPr>
+            <a:r>
+              <a:rPr lang="fr-FR" dirty="0" smtClean="0">
+                <a:hlinkClick r:id="rId2"/>
+              </a:rPr>
+              <a:t>https</a:t>
+            </a:r>
+            <a:r>
+              <a:rPr lang="fr-FR" dirty="0">
+                <a:hlinkClick r:id="rId2"/>
+              </a:rPr>
+              <a:t>://</a:t>
+            </a:r>
+            <a:r>
+              <a:rPr lang="fr-FR" dirty="0" smtClean="0">
+                <a:hlinkClick r:id="rId2"/>
+              </a:rPr>
+              <a:t>openclassrooms.com/fr/courses/4087056-testez-et-suivez-letat-de-votre-application-php/4419481-tp-mettre-en-place-un-outil-dintegration-continue-travis</a:t>
+            </a:r>
+            <a:endParaRPr lang="fr-FR" dirty="0" smtClean="0"/>
+          </a:p>
+          <a:p>
+            <a:pPr marL="0" indent="0">
+              <a:buNone/>
+            </a:pPr>
+            <a:r>
+              <a:rPr lang="fr-FR" dirty="0">
+                <a:hlinkClick r:id="rId3"/>
+              </a:rPr>
+              <a:t>https://</a:t>
+            </a:r>
+            <a:r>
+              <a:rPr lang="fr-FR" dirty="0" smtClean="0">
+                <a:hlinkClick r:id="rId3"/>
+              </a:rPr>
+              <a:t>github.com/MarcusBarnes/mik/issues/272</a:t>
+            </a:r>
+            <a:endParaRPr lang="fr-FR" dirty="0" smtClean="0"/>
+          </a:p>
+          <a:p>
+            <a:pPr marL="0" indent="0">
+              <a:buNone/>
+            </a:pPr>
+            <a:endParaRPr lang="fr-FR" dirty="0" smtClean="0"/>
+          </a:p>
+          <a:p>
+            <a:r>
+              <a:rPr lang="fr-FR" dirty="0" smtClean="0"/>
+              <a:t>Jenkins : </a:t>
+            </a:r>
+          </a:p>
+          <a:p>
+            <a:pPr marL="0" indent="0">
+              <a:buNone/>
+            </a:pPr>
+            <a:r>
+              <a:rPr lang="fr-FR" dirty="0">
+                <a:hlinkClick r:id="rId4"/>
+              </a:rPr>
+              <a:t>https://blog.pascal-martin.fr/post/integration-continue-jenkins-projet-php</a:t>
+            </a:r>
+            <a:r>
+              <a:rPr lang="fr-FR" dirty="0" smtClean="0">
+                <a:hlinkClick r:id="rId4"/>
+              </a:rPr>
+              <a:t>/</a:t>
+            </a:r>
+            <a:endParaRPr lang="fr-FR" dirty="0" smtClean="0"/>
+          </a:p>
+          <a:p>
+            <a:pPr marL="0" indent="0">
+              <a:buNone/>
+            </a:pPr>
+            <a:endParaRPr lang="fr-FR" dirty="0"/>
+          </a:p>
+        </p:txBody>
+      </p:sp>
+    </p:spTree>
+    <p:extLst>
+      <p:ext uri="{BB962C8B-B14F-4D97-AF65-F5344CB8AC3E}">
+        <p14:creationId xmlns:p14="http://schemas.microsoft.com/office/powerpoint/2010/main" val="412892584"/>
+      </p:ext>
+    </p:extLst>
+  </p:cSld>
+  <p:clrMapOvr>
+    <a:masterClrMapping/>
+  </p:clrMapOvr>
+  <p:timing>
+    <p:tnLst>
+      <p:par>
+        <p:cTn id="1" dur="indefinite" restart="never" nodeType="tmRoot"/>
+      </p:par>
+    </p:tnLst>
+  </p:timing>
+</p:sld>
+</file>
+
+<file path=ppt/slides/slide44.xml><?xml version="1.0" encoding="utf-8"?>
+<p:sld xmlns:a="http://schemas.openxmlformats.org/drawingml/2006/main" xmlns:r="http://schemas.openxmlformats.org/officeDocument/2006/relationships" xmlns:p="http://schemas.openxmlformats.org/presentationml/2006/main">
+  <p:cSld>
+    <p:spTree>
+      <p:nvGrpSpPr>
+        <p:cNvPr id="1" name=""/>
+        <p:cNvGrpSpPr/>
+        <p:nvPr/>
+      </p:nvGrpSpPr>
+      <p:grpSpPr>
+        <a:xfrm>
+          <a:off x="0" y="0"/>
+          <a:ext cx="0" cy="0"/>
+          <a:chOff x="0" y="0"/>
+          <a:chExt cx="0" cy="0"/>
+        </a:xfrm>
+      </p:grpSpPr>
+      <p:sp>
+        <p:nvSpPr>
+          <p:cNvPr id="2" name="Titre 1"/>
+          <p:cNvSpPr>
+            <a:spLocks noGrp="1"/>
+          </p:cNvSpPr>
+          <p:nvPr>
+            <p:ph type="title"/>
+          </p:nvPr>
+        </p:nvSpPr>
+        <p:spPr/>
+        <p:txBody>
+          <a:bodyPr/>
+          <a:lstStyle/>
+          <a:p>
+            <a:r>
+              <a:rPr lang="fr-FR" dirty="0" smtClean="0"/>
+              <a:t>Configuration en mode </a:t>
+            </a:r>
+            <a:r>
+              <a:rPr lang="fr-FR" dirty="0" smtClean="0">
+                <a:solidFill>
+                  <a:srgbClr val="00B050"/>
+                </a:solidFill>
+              </a:rPr>
+              <a:t>CI/CD</a:t>
+            </a:r>
+            <a:endParaRPr lang="fr-FR" dirty="0">
+              <a:solidFill>
+                <a:srgbClr val="00B050"/>
+              </a:solidFill>
+            </a:endParaRPr>
+          </a:p>
+        </p:txBody>
+      </p:sp>
+      <p:sp>
+        <p:nvSpPr>
+          <p:cNvPr id="3" name="Espace réservé du contenu 2"/>
+          <p:cNvSpPr>
+            <a:spLocks noGrp="1"/>
+          </p:cNvSpPr>
+          <p:nvPr>
+            <p:ph idx="1"/>
+          </p:nvPr>
+        </p:nvSpPr>
+        <p:spPr/>
+        <p:txBody>
+          <a:bodyPr/>
+          <a:lstStyle/>
+          <a:p>
+            <a:r>
               <a:rPr lang="fr-FR" dirty="0" err="1" smtClean="0"/>
               <a:t>GitLab</a:t>
             </a:r>
@@ -24906,7 +25327,7 @@
 </p:sld>
 </file>
 
-<file path=ppt/slides/slide44.xml><?xml version="1.0" encoding="utf-8"?>
+<file path=ppt/slides/slide45.xml><?xml version="1.0" encoding="utf-8"?>
 <p:sld xmlns:a="http://schemas.openxmlformats.org/drawingml/2006/main" xmlns:r="http://schemas.openxmlformats.org/officeDocument/2006/relationships" xmlns:p="http://schemas.openxmlformats.org/presentationml/2006/main">
   <p:cSld>
     <p:spTree>
@@ -25298,7 +25719,7 @@
 </p:sld>
 </file>
 
-<file path=ppt/slides/slide45.xml><?xml version="1.0" encoding="utf-8"?>
+<file path=ppt/slides/slide46.xml><?xml version="1.0" encoding="utf-8"?>
 <p:sld xmlns:a="http://schemas.openxmlformats.org/drawingml/2006/main" xmlns:r="http://schemas.openxmlformats.org/officeDocument/2006/relationships" xmlns:p="http://schemas.openxmlformats.org/presentationml/2006/main">
   <p:cSld>
     <p:spTree>
@@ -25465,7 +25886,7 @@
 </p:sld>
 </file>
 
-<file path=ppt/slides/slide46.xml><?xml version="1.0" encoding="utf-8"?>
+<file path=ppt/slides/slide47.xml><?xml version="1.0" encoding="utf-8"?>
 <p:sld xmlns:a="http://schemas.openxmlformats.org/drawingml/2006/main" xmlns:r="http://schemas.openxmlformats.org/officeDocument/2006/relationships" xmlns:p="http://schemas.openxmlformats.org/presentationml/2006/main">
   <p:cSld>
     <p:spTree>
@@ -25531,7 +25952,7 @@
 </p:sld>
 </file>
 
-<file path=ppt/slides/slide47.xml><?xml version="1.0" encoding="utf-8"?>
+<file path=ppt/slides/slide48.xml><?xml version="1.0" encoding="utf-8"?>
 <p:sld xmlns:a="http://schemas.openxmlformats.org/drawingml/2006/main" xmlns:r="http://schemas.openxmlformats.org/officeDocument/2006/relationships" xmlns:p="http://schemas.openxmlformats.org/presentationml/2006/main">
   <p:cSld>
     <p:spTree>
@@ -25681,7 +26102,7 @@
           <p:nvPr>
             <p:extLst>
               <p:ext uri="{D42A27DB-BD31-4B8C-83A1-F6EECF244321}">
-                <p14:modId xmlns:p14="http://schemas.microsoft.com/office/powerpoint/2010/main" val="1351073384"/>
+                <p14:modId xmlns:p14="http://schemas.microsoft.com/office/powerpoint/2010/main" val="1317635715"/>
               </p:ext>
             </p:extLst>
           </p:nvPr>
@@ -25761,7 +26182,7 @@
                       </a:r>
                       <a:r>
                         <a:rPr lang="fr-FR" b="0" dirty="0" err="1" smtClean="0"/>
-                        <a:t>someUnitTest</a:t>
+                        <a:t>testSomeUnitTest</a:t>
                       </a:r>
                       <a:r>
                         <a:rPr lang="fr-FR" b="0" dirty="0" smtClean="0"/>
@@ -25943,7 +26364,7 @@
 </p:sld>
 </file>
 
-<file path=ppt/slides/slide48.xml><?xml version="1.0" encoding="utf-8"?>
+<file path=ppt/slides/slide49.xml><?xml version="1.0" encoding="utf-8"?>
 <p:sld xmlns:a="http://schemas.openxmlformats.org/drawingml/2006/main" xmlns:r="http://schemas.openxmlformats.org/officeDocument/2006/relationships" xmlns:p="http://schemas.openxmlformats.org/presentationml/2006/main">
   <p:cSld>
     <p:spTree>
@@ -26182,254 +26603,6 @@
     <p:extLst>
       <p:ext uri="{BB962C8B-B14F-4D97-AF65-F5344CB8AC3E}">
         <p14:creationId xmlns:p14="http://schemas.microsoft.com/office/powerpoint/2010/main" val="3227277427"/>
-      </p:ext>
-    </p:extLst>
-  </p:cSld>
-  <p:clrMapOvr>
-    <a:masterClrMapping/>
-  </p:clrMapOvr>
-  <p:timing>
-    <p:tnLst>
-      <p:par>
-        <p:cTn id="1" dur="indefinite" restart="never" nodeType="tmRoot"/>
-      </p:par>
-    </p:tnLst>
-  </p:timing>
-</p:sld>
-</file>
-
-<file path=ppt/slides/slide49.xml><?xml version="1.0" encoding="utf-8"?>
-<p:sld xmlns:a="http://schemas.openxmlformats.org/drawingml/2006/main" xmlns:r="http://schemas.openxmlformats.org/officeDocument/2006/relationships" xmlns:p="http://schemas.openxmlformats.org/presentationml/2006/main">
-  <p:cSld>
-    <p:spTree>
-      <p:nvGrpSpPr>
-        <p:cNvPr id="1" name=""/>
-        <p:cNvGrpSpPr/>
-        <p:nvPr/>
-      </p:nvGrpSpPr>
-      <p:grpSpPr>
-        <a:xfrm>
-          <a:off x="0" y="0"/>
-          <a:ext cx="0" cy="0"/>
-          <a:chOff x="0" y="0"/>
-          <a:chExt cx="0" cy="0"/>
-        </a:xfrm>
-      </p:grpSpPr>
-      <p:sp>
-        <p:nvSpPr>
-          <p:cNvPr id="5" name="Titre 4"/>
-          <p:cNvSpPr>
-            <a:spLocks noGrp="1"/>
-          </p:cNvSpPr>
-          <p:nvPr>
-            <p:ph type="title"/>
-          </p:nvPr>
-        </p:nvSpPr>
-        <p:spPr/>
-        <p:txBody>
-          <a:bodyPr/>
-          <a:lstStyle/>
-          <a:p>
-            <a:r>
-              <a:rPr lang="fr-FR" dirty="0" err="1" smtClean="0"/>
-              <a:t>Javascript</a:t>
-            </a:r>
-            <a:endParaRPr lang="fr-FR" dirty="0"/>
-          </a:p>
-        </p:txBody>
-      </p:sp>
-      <p:sp>
-        <p:nvSpPr>
-          <p:cNvPr id="6" name="Espace réservé du contenu 5"/>
-          <p:cNvSpPr>
-            <a:spLocks noGrp="1"/>
-          </p:cNvSpPr>
-          <p:nvPr>
-            <p:ph idx="1"/>
-          </p:nvPr>
-        </p:nvSpPr>
-        <p:spPr/>
-        <p:txBody>
-          <a:bodyPr/>
-          <a:lstStyle/>
-          <a:p>
-            <a:r>
-              <a:rPr lang="fr-FR" dirty="0" smtClean="0"/>
-              <a:t>Il est possible d’exécuter du </a:t>
-            </a:r>
-            <a:r>
-              <a:rPr lang="fr-FR" dirty="0" err="1" smtClean="0"/>
-              <a:t>javascript</a:t>
-            </a:r>
-            <a:r>
-              <a:rPr lang="fr-FR" dirty="0" smtClean="0"/>
-              <a:t> directement dans le navigateur.</a:t>
-            </a:r>
-            <a:endParaRPr lang="fr-FR" dirty="0" smtClean="0"/>
-          </a:p>
-          <a:p>
-            <a:endParaRPr lang="fr-FR" dirty="0"/>
-          </a:p>
-          <a:p>
-            <a:endParaRPr lang="fr-FR" dirty="0" smtClean="0"/>
-          </a:p>
-          <a:p>
-            <a:endParaRPr lang="fr-FR" dirty="0"/>
-          </a:p>
-          <a:p>
-            <a:endParaRPr lang="fr-FR" dirty="0" smtClean="0"/>
-          </a:p>
-          <a:p>
-            <a:r>
-              <a:rPr lang="fr-FR" dirty="0" smtClean="0"/>
-              <a:t>Liste d’exemples :</a:t>
-            </a:r>
-          </a:p>
-          <a:p>
-            <a:pPr marL="0" indent="0">
-              <a:buNone/>
-            </a:pPr>
-            <a:r>
-              <a:rPr lang="fr-FR" dirty="0">
-                <a:hlinkClick r:id="rId3"/>
-              </a:rPr>
-              <a:t>https://github.com/symfony/panther/blob/master/tests</a:t>
-            </a:r>
-            <a:r>
-              <a:rPr lang="fr-FR" dirty="0" smtClean="0">
-                <a:hlinkClick r:id="rId3"/>
-              </a:rPr>
-              <a:t>/</a:t>
-            </a:r>
-            <a:endParaRPr lang="fr-FR" dirty="0" smtClean="0"/>
-          </a:p>
-          <a:p>
-            <a:pPr marL="0" indent="0">
-              <a:buNone/>
-            </a:pPr>
-            <a:endParaRPr lang="fr-FR" dirty="0"/>
-          </a:p>
-        </p:txBody>
-      </p:sp>
-      <p:sp>
-        <p:nvSpPr>
-          <p:cNvPr id="7" name="ZoneTexte 6"/>
-          <p:cNvSpPr txBox="1"/>
-          <p:nvPr/>
-        </p:nvSpPr>
-        <p:spPr>
-          <a:xfrm>
-            <a:off x="10510378" y="589337"/>
-            <a:ext cx="530915" cy="461665"/>
-          </a:xfrm>
-          <a:prstGeom prst="rect">
-            <a:avLst/>
-          </a:prstGeom>
-          <a:noFill/>
-        </p:spPr>
-        <p:txBody>
-          <a:bodyPr wrap="none" rtlCol="0">
-            <a:spAutoFit/>
-          </a:bodyPr>
-          <a:lstStyle/>
-          <a:p>
-            <a:r>
-              <a:rPr lang="fr-FR" sz="2400" b="1" dirty="0" smtClean="0">
-                <a:solidFill>
-                  <a:schemeClr val="bg1"/>
-                </a:solidFill>
-              </a:rPr>
-              <a:t>02</a:t>
-            </a:r>
-            <a:endParaRPr lang="fr-FR" sz="2400" b="1" dirty="0">
-              <a:solidFill>
-                <a:schemeClr val="bg1"/>
-              </a:solidFill>
-            </a:endParaRPr>
-          </a:p>
-        </p:txBody>
-      </p:sp>
-      <p:graphicFrame>
-        <p:nvGraphicFramePr>
-          <p:cNvPr id="8" name="Tableau 7"/>
-          <p:cNvGraphicFramePr>
-            <a:graphicFrameLocks noGrp="1"/>
-          </p:cNvGraphicFramePr>
-          <p:nvPr>
-            <p:extLst>
-              <p:ext uri="{D42A27DB-BD31-4B8C-83A1-F6EECF244321}">
-                <p14:modId xmlns:p14="http://schemas.microsoft.com/office/powerpoint/2010/main" val="4150175691"/>
-              </p:ext>
-            </p:extLst>
-          </p:nvPr>
-        </p:nvGraphicFramePr>
-        <p:xfrm>
-          <a:off x="1471660" y="3940810"/>
-          <a:ext cx="8128000" cy="370840"/>
-        </p:xfrm>
-        <a:graphic>
-          <a:graphicData uri="http://schemas.openxmlformats.org/drawingml/2006/table">
-            <a:tbl>
-              <a:tblPr firstRow="1" bandRow="1">
-                <a:tableStyleId>{5C22544A-7EE6-4342-B048-85BDC9FD1C3A}</a:tableStyleId>
-              </a:tblPr>
-              <a:tblGrid>
-                <a:gridCol w="8128000"/>
-              </a:tblGrid>
-              <a:tr h="370840">
-                <a:tc>
-                  <a:txBody>
-                    <a:bodyPr/>
-                    <a:lstStyle/>
-                    <a:p>
-                      <a:pPr marL="400050" lvl="1" indent="0">
-                        <a:buNone/>
-                      </a:pPr>
-                      <a:r>
-                        <a:rPr lang="fr-FR" b="0" dirty="0" smtClean="0"/>
-                        <a:t>$client-&gt;</a:t>
-                      </a:r>
-                      <a:r>
-                        <a:rPr lang="fr-FR" b="0" dirty="0" err="1" smtClean="0"/>
-                        <a:t>executeScript</a:t>
-                      </a:r>
-                      <a:r>
-                        <a:rPr lang="fr-FR" b="0" dirty="0" smtClean="0"/>
-                        <a:t>(‘</a:t>
-                      </a:r>
-                      <a:r>
-                        <a:rPr lang="fr-FR" b="1" dirty="0" err="1" smtClean="0"/>
-                        <a:t>alert</a:t>
-                      </a:r>
-                      <a:r>
-                        <a:rPr lang="fr-FR" b="1" dirty="0" smtClean="0"/>
-                        <a:t>(\’</a:t>
-                      </a:r>
-                      <a:r>
-                        <a:rPr lang="fr-FR" b="1" dirty="0" err="1" smtClean="0"/>
-                        <a:t>Javascript</a:t>
-                      </a:r>
-                      <a:r>
-                        <a:rPr lang="fr-FR" b="1" dirty="0" smtClean="0"/>
-                        <a:t>\’)</a:t>
-                      </a:r>
-                      <a:r>
-                        <a:rPr lang="fr-FR" b="0" dirty="0" smtClean="0"/>
-                        <a:t>’);</a:t>
-                      </a:r>
-                    </a:p>
-                  </a:txBody>
-                  <a:tcPr/>
-                </a:tc>
-              </a:tr>
-            </a:tbl>
-          </a:graphicData>
-        </a:graphic>
-      </p:graphicFrame>
-    </p:spTree>
-    <p:extLst>
-      <p:ext uri="{BB962C8B-B14F-4D97-AF65-F5344CB8AC3E}">
-        <p14:creationId xmlns:p14="http://schemas.microsoft.com/office/powerpoint/2010/main" val="1633323789"/>
       </p:ext>
     </p:extLst>
   </p:cSld>
@@ -26604,6 +26777,254 @@
           <a:lstStyle/>
           <a:p>
             <a:r>
+              <a:rPr lang="fr-FR" dirty="0" err="1" smtClean="0"/>
+              <a:t>Javascript</a:t>
+            </a:r>
+            <a:endParaRPr lang="fr-FR" dirty="0"/>
+          </a:p>
+        </p:txBody>
+      </p:sp>
+      <p:sp>
+        <p:nvSpPr>
+          <p:cNvPr id="6" name="Espace réservé du contenu 5"/>
+          <p:cNvSpPr>
+            <a:spLocks noGrp="1"/>
+          </p:cNvSpPr>
+          <p:nvPr>
+            <p:ph idx="1"/>
+          </p:nvPr>
+        </p:nvSpPr>
+        <p:spPr/>
+        <p:txBody>
+          <a:bodyPr/>
+          <a:lstStyle/>
+          <a:p>
+            <a:r>
+              <a:rPr lang="fr-FR" dirty="0" smtClean="0"/>
+              <a:t>Il est possible d’exécuter du </a:t>
+            </a:r>
+            <a:r>
+              <a:rPr lang="fr-FR" dirty="0" err="1" smtClean="0"/>
+              <a:t>javascript</a:t>
+            </a:r>
+            <a:r>
+              <a:rPr lang="fr-FR" dirty="0" smtClean="0"/>
+              <a:t> directement dans le navigateur.</a:t>
+            </a:r>
+            <a:endParaRPr lang="fr-FR" dirty="0" smtClean="0"/>
+          </a:p>
+          <a:p>
+            <a:endParaRPr lang="fr-FR" dirty="0"/>
+          </a:p>
+          <a:p>
+            <a:endParaRPr lang="fr-FR" dirty="0" smtClean="0"/>
+          </a:p>
+          <a:p>
+            <a:endParaRPr lang="fr-FR" dirty="0"/>
+          </a:p>
+          <a:p>
+            <a:endParaRPr lang="fr-FR" dirty="0" smtClean="0"/>
+          </a:p>
+          <a:p>
+            <a:r>
+              <a:rPr lang="fr-FR" dirty="0" smtClean="0"/>
+              <a:t>Liste d’exemples :</a:t>
+            </a:r>
+          </a:p>
+          <a:p>
+            <a:pPr marL="0" indent="0">
+              <a:buNone/>
+            </a:pPr>
+            <a:r>
+              <a:rPr lang="fr-FR" dirty="0">
+                <a:hlinkClick r:id="rId3"/>
+              </a:rPr>
+              <a:t>https://github.com/symfony/panther/blob/master/tests</a:t>
+            </a:r>
+            <a:r>
+              <a:rPr lang="fr-FR" dirty="0" smtClean="0">
+                <a:hlinkClick r:id="rId3"/>
+              </a:rPr>
+              <a:t>/</a:t>
+            </a:r>
+            <a:endParaRPr lang="fr-FR" dirty="0" smtClean="0"/>
+          </a:p>
+          <a:p>
+            <a:pPr marL="0" indent="0">
+              <a:buNone/>
+            </a:pPr>
+            <a:endParaRPr lang="fr-FR" dirty="0"/>
+          </a:p>
+        </p:txBody>
+      </p:sp>
+      <p:sp>
+        <p:nvSpPr>
+          <p:cNvPr id="7" name="ZoneTexte 6"/>
+          <p:cNvSpPr txBox="1"/>
+          <p:nvPr/>
+        </p:nvSpPr>
+        <p:spPr>
+          <a:xfrm>
+            <a:off x="10510378" y="589337"/>
+            <a:ext cx="530915" cy="461665"/>
+          </a:xfrm>
+          <a:prstGeom prst="rect">
+            <a:avLst/>
+          </a:prstGeom>
+          <a:noFill/>
+        </p:spPr>
+        <p:txBody>
+          <a:bodyPr wrap="none" rtlCol="0">
+            <a:spAutoFit/>
+          </a:bodyPr>
+          <a:lstStyle/>
+          <a:p>
+            <a:r>
+              <a:rPr lang="fr-FR" sz="2400" b="1" dirty="0" smtClean="0">
+                <a:solidFill>
+                  <a:schemeClr val="bg1"/>
+                </a:solidFill>
+              </a:rPr>
+              <a:t>02</a:t>
+            </a:r>
+            <a:endParaRPr lang="fr-FR" sz="2400" b="1" dirty="0">
+              <a:solidFill>
+                <a:schemeClr val="bg1"/>
+              </a:solidFill>
+            </a:endParaRPr>
+          </a:p>
+        </p:txBody>
+      </p:sp>
+      <p:graphicFrame>
+        <p:nvGraphicFramePr>
+          <p:cNvPr id="8" name="Tableau 7"/>
+          <p:cNvGraphicFramePr>
+            <a:graphicFrameLocks noGrp="1"/>
+          </p:cNvGraphicFramePr>
+          <p:nvPr>
+            <p:extLst>
+              <p:ext uri="{D42A27DB-BD31-4B8C-83A1-F6EECF244321}">
+                <p14:modId xmlns:p14="http://schemas.microsoft.com/office/powerpoint/2010/main" val="4150175691"/>
+              </p:ext>
+            </p:extLst>
+          </p:nvPr>
+        </p:nvGraphicFramePr>
+        <p:xfrm>
+          <a:off x="1471660" y="3940810"/>
+          <a:ext cx="8128000" cy="370840"/>
+        </p:xfrm>
+        <a:graphic>
+          <a:graphicData uri="http://schemas.openxmlformats.org/drawingml/2006/table">
+            <a:tbl>
+              <a:tblPr firstRow="1" bandRow="1">
+                <a:tableStyleId>{5C22544A-7EE6-4342-B048-85BDC9FD1C3A}</a:tableStyleId>
+              </a:tblPr>
+              <a:tblGrid>
+                <a:gridCol w="8128000"/>
+              </a:tblGrid>
+              <a:tr h="370840">
+                <a:tc>
+                  <a:txBody>
+                    <a:bodyPr/>
+                    <a:lstStyle/>
+                    <a:p>
+                      <a:pPr marL="400050" lvl="1" indent="0">
+                        <a:buNone/>
+                      </a:pPr>
+                      <a:r>
+                        <a:rPr lang="fr-FR" b="0" dirty="0" smtClean="0"/>
+                        <a:t>$client-&gt;</a:t>
+                      </a:r>
+                      <a:r>
+                        <a:rPr lang="fr-FR" b="0" dirty="0" err="1" smtClean="0"/>
+                        <a:t>executeScript</a:t>
+                      </a:r>
+                      <a:r>
+                        <a:rPr lang="fr-FR" b="0" dirty="0" smtClean="0"/>
+                        <a:t>(‘</a:t>
+                      </a:r>
+                      <a:r>
+                        <a:rPr lang="fr-FR" b="1" dirty="0" err="1" smtClean="0"/>
+                        <a:t>alert</a:t>
+                      </a:r>
+                      <a:r>
+                        <a:rPr lang="fr-FR" b="1" dirty="0" smtClean="0"/>
+                        <a:t>(\’</a:t>
+                      </a:r>
+                      <a:r>
+                        <a:rPr lang="fr-FR" b="1" dirty="0" err="1" smtClean="0"/>
+                        <a:t>Javascript</a:t>
+                      </a:r>
+                      <a:r>
+                        <a:rPr lang="fr-FR" b="1" dirty="0" smtClean="0"/>
+                        <a:t>\’)</a:t>
+                      </a:r>
+                      <a:r>
+                        <a:rPr lang="fr-FR" b="0" dirty="0" smtClean="0"/>
+                        <a:t>’);</a:t>
+                      </a:r>
+                    </a:p>
+                  </a:txBody>
+                  <a:tcPr/>
+                </a:tc>
+              </a:tr>
+            </a:tbl>
+          </a:graphicData>
+        </a:graphic>
+      </p:graphicFrame>
+    </p:spTree>
+    <p:extLst>
+      <p:ext uri="{BB962C8B-B14F-4D97-AF65-F5344CB8AC3E}">
+        <p14:creationId xmlns:p14="http://schemas.microsoft.com/office/powerpoint/2010/main" val="1633323789"/>
+      </p:ext>
+    </p:extLst>
+  </p:cSld>
+  <p:clrMapOvr>
+    <a:masterClrMapping/>
+  </p:clrMapOvr>
+  <p:timing>
+    <p:tnLst>
+      <p:par>
+        <p:cTn id="1" dur="indefinite" restart="never" nodeType="tmRoot"/>
+      </p:par>
+    </p:tnLst>
+  </p:timing>
+</p:sld>
+</file>
+
+<file path=ppt/slides/slide51.xml><?xml version="1.0" encoding="utf-8"?>
+<p:sld xmlns:a="http://schemas.openxmlformats.org/drawingml/2006/main" xmlns:r="http://schemas.openxmlformats.org/officeDocument/2006/relationships" xmlns:p="http://schemas.openxmlformats.org/presentationml/2006/main">
+  <p:cSld>
+    <p:spTree>
+      <p:nvGrpSpPr>
+        <p:cNvPr id="1" name=""/>
+        <p:cNvGrpSpPr/>
+        <p:nvPr/>
+      </p:nvGrpSpPr>
+      <p:grpSpPr>
+        <a:xfrm>
+          <a:off x="0" y="0"/>
+          <a:ext cx="0" cy="0"/>
+          <a:chOff x="0" y="0"/>
+          <a:chExt cx="0" cy="0"/>
+        </a:xfrm>
+      </p:grpSpPr>
+      <p:sp>
+        <p:nvSpPr>
+          <p:cNvPr id="5" name="Titre 4"/>
+          <p:cNvSpPr>
+            <a:spLocks noGrp="1"/>
+          </p:cNvSpPr>
+          <p:nvPr>
+            <p:ph type="title"/>
+          </p:nvPr>
+        </p:nvSpPr>
+        <p:spPr/>
+        <p:txBody>
+          <a:bodyPr/>
+          <a:lstStyle/>
+          <a:p>
+            <a:r>
               <a:rPr lang="fr-FR" dirty="0" smtClean="0"/>
               <a:t>Autres</a:t>
             </a:r>
@@ -26998,7 +27419,7 @@
 </p:sld>
 </file>
 
-<file path=ppt/slides/slide51.xml><?xml version="1.0" encoding="utf-8"?>
+<file path=ppt/slides/slide52.xml><?xml version="1.0" encoding="utf-8"?>
 <p:sld xmlns:a="http://schemas.openxmlformats.org/drawingml/2006/main" xmlns:r="http://schemas.openxmlformats.org/officeDocument/2006/relationships" xmlns:p="http://schemas.openxmlformats.org/presentationml/2006/main">
   <p:cSld>
     <p:spTree>
@@ -27253,7 +27674,7 @@
 </p:sld>
 </file>
 
-<file path=ppt/slides/slide52.xml><?xml version="1.0" encoding="utf-8"?>
+<file path=ppt/slides/slide53.xml><?xml version="1.0" encoding="utf-8"?>
 <p:sld xmlns:a="http://schemas.openxmlformats.org/drawingml/2006/main" xmlns:r="http://schemas.openxmlformats.org/officeDocument/2006/relationships" xmlns:p="http://schemas.openxmlformats.org/presentationml/2006/main">
   <p:cSld>
     <p:spTree>
@@ -27492,7 +27913,7 @@
 </p:sld>
 </file>
 
-<file path=ppt/slides/slide53.xml><?xml version="1.0" encoding="utf-8"?>
+<file path=ppt/slides/slide54.xml><?xml version="1.0" encoding="utf-8"?>
 <p:sld xmlns:a="http://schemas.openxmlformats.org/drawingml/2006/main" xmlns:r="http://schemas.openxmlformats.org/officeDocument/2006/relationships" xmlns:p="http://schemas.openxmlformats.org/presentationml/2006/main">
   <p:cSld>
     <p:spTree>
@@ -27954,7 +28375,7 @@
 </p:sld>
 </file>
 
-<file path=ppt/slides/slide54.xml><?xml version="1.0" encoding="utf-8"?>
+<file path=ppt/slides/slide55.xml><?xml version="1.0" encoding="utf-8"?>
 <p:sld xmlns:a="http://schemas.openxmlformats.org/drawingml/2006/main" xmlns:r="http://schemas.openxmlformats.org/officeDocument/2006/relationships" xmlns:p="http://schemas.openxmlformats.org/presentationml/2006/main">
   <p:cSld>
     <p:spTree>
@@ -28139,7 +28560,7 @@
 </p:sld>
 </file>
 
-<file path=ppt/slides/slide55.xml><?xml version="1.0" encoding="utf-8"?>
+<file path=ppt/slides/slide56.xml><?xml version="1.0" encoding="utf-8"?>
 <p:sld xmlns:a="http://schemas.openxmlformats.org/drawingml/2006/main" xmlns:r="http://schemas.openxmlformats.org/officeDocument/2006/relationships" xmlns:p="http://schemas.openxmlformats.org/presentationml/2006/main">
   <p:cSld>
     <p:spTree>
@@ -28313,7 +28734,7 @@
 </p:sld>
 </file>
 
-<file path=ppt/slides/slide56.xml><?xml version="1.0" encoding="utf-8"?>
+<file path=ppt/slides/slide57.xml><?xml version="1.0" encoding="utf-8"?>
 <p:sld xmlns:a="http://schemas.openxmlformats.org/drawingml/2006/main" xmlns:r="http://schemas.openxmlformats.org/officeDocument/2006/relationships" xmlns:p="http://schemas.openxmlformats.org/presentationml/2006/main">
   <p:cSld>
     <p:spTree>

</xml_diff>